<commit_message>
3/9/2021 11:47 the last update f salle de lecture
</commit_message>
<xml_diff>
--- a/Presentation-projet-SQLite.pptx
+++ b/Presentation-projet-SQLite.pptx
@@ -290,7 +290,7 @@
           <a:p>
             <a:fld id="{5AB0D58B-1CA4-4E9D-A493-960D8694032C}" type="datetimeFigureOut">
               <a:rPr lang="fr-FR" smtClean="0"/>
-              <a:t>28/02/2021</a:t>
+              <a:t>09/03/2021</a:t>
             </a:fld>
             <a:endParaRPr lang="fr-FR"/>
           </a:p>
@@ -456,7 +456,7 @@
           <a:p>
             <a:fld id="{F80B55E0-88E5-4B0C-B49A-E9075B3352A2}" type="datetimeFigureOut">
               <a:rPr lang="fr-FR" smtClean="0"/>
-              <a:t>28/02/2021</a:t>
+              <a:t>09/03/2021</a:t>
             </a:fld>
             <a:endParaRPr lang="fr-FR"/>
           </a:p>
@@ -854,7 +854,7 @@
           <a:p>
             <a:fld id="{E88E51D1-19E0-4A91-93E4-F6582C82DFE9}" type="datetime1">
               <a:rPr lang="fr-FR" smtClean="0"/>
-              <a:t>28/02/2021</a:t>
+              <a:t>09/03/2021</a:t>
             </a:fld>
             <a:endParaRPr lang="fr-FR"/>
           </a:p>
@@ -1023,7 +1023,7 @@
           <a:p>
             <a:fld id="{6FE1E652-55A6-4E86-A9CD-07BB054ED371}" type="datetime1">
               <a:rPr lang="fr-FR" smtClean="0"/>
-              <a:t>28/02/2021</a:t>
+              <a:t>09/03/2021</a:t>
             </a:fld>
             <a:endParaRPr lang="fr-FR"/>
           </a:p>
@@ -1203,7 +1203,7 @@
           <a:p>
             <a:fld id="{6FE1E652-55A6-4E86-A9CD-07BB054ED371}" type="datetime1">
               <a:rPr lang="fr-FR" smtClean="0"/>
-              <a:t>28/02/2021</a:t>
+              <a:t>09/03/2021</a:t>
             </a:fld>
             <a:endParaRPr lang="fr-FR"/>
           </a:p>
@@ -1373,7 +1373,7 @@
           <a:p>
             <a:fld id="{6FE1E652-55A6-4E86-A9CD-07BB054ED371}" type="datetime1">
               <a:rPr lang="fr-FR" smtClean="0"/>
-              <a:t>28/02/2021</a:t>
+              <a:t>09/03/2021</a:t>
             </a:fld>
             <a:endParaRPr lang="fr-FR"/>
           </a:p>
@@ -1620,7 +1620,7 @@
           <a:p>
             <a:fld id="{00C31191-9C07-4668-B2BC-5089C650D2B7}" type="datetime1">
               <a:rPr lang="fr-FR" smtClean="0"/>
-              <a:t>28/02/2021</a:t>
+              <a:t>09/03/2021</a:t>
             </a:fld>
             <a:endParaRPr lang="fr-FR"/>
           </a:p>
@@ -1849,7 +1849,7 @@
           <a:p>
             <a:fld id="{6FE1E652-55A6-4E86-A9CD-07BB054ED371}" type="datetime1">
               <a:rPr lang="fr-FR" smtClean="0"/>
-              <a:t>28/02/2021</a:t>
+              <a:t>09/03/2021</a:t>
             </a:fld>
             <a:endParaRPr lang="fr-FR"/>
           </a:p>
@@ -2215,7 +2215,7 @@
           <a:p>
             <a:fld id="{6FE1E652-55A6-4E86-A9CD-07BB054ED371}" type="datetime1">
               <a:rPr lang="fr-FR" smtClean="0"/>
-              <a:t>28/02/2021</a:t>
+              <a:t>09/03/2021</a:t>
             </a:fld>
             <a:endParaRPr lang="fr-FR"/>
           </a:p>
@@ -2334,7 +2334,7 @@
           <a:p>
             <a:fld id="{C37F1761-D244-4832-A897-AA9BFF027495}" type="datetime1">
               <a:rPr lang="fr-FR" smtClean="0"/>
-              <a:t>28/02/2021</a:t>
+              <a:t>09/03/2021</a:t>
             </a:fld>
             <a:endParaRPr lang="fr-FR"/>
           </a:p>
@@ -2429,7 +2429,7 @@
           <a:p>
             <a:fld id="{DB79BAB4-633D-4B71-A80A-06DCCB7E61AD}" type="datetime1">
               <a:rPr lang="fr-FR" smtClean="0"/>
-              <a:t>28/02/2021</a:t>
+              <a:t>09/03/2021</a:t>
             </a:fld>
             <a:endParaRPr lang="fr-FR"/>
           </a:p>
@@ -2704,7 +2704,7 @@
           <a:p>
             <a:fld id="{6FE1E652-55A6-4E86-A9CD-07BB054ED371}" type="datetime1">
               <a:rPr lang="fr-FR" smtClean="0"/>
-              <a:t>28/02/2021</a:t>
+              <a:t>09/03/2021</a:t>
             </a:fld>
             <a:endParaRPr lang="fr-FR"/>
           </a:p>
@@ -2958,7 +2958,7 @@
           <a:p>
             <a:fld id="{C1203806-AA52-4B57-B194-5A147094410C}" type="datetime1">
               <a:rPr lang="fr-FR" smtClean="0"/>
-              <a:t>28/02/2021</a:t>
+              <a:t>09/03/2021</a:t>
             </a:fld>
             <a:endParaRPr lang="fr-FR"/>
           </a:p>
@@ -3169,7 +3169,7 @@
           <a:p>
             <a:fld id="{6FE1E652-55A6-4E86-A9CD-07BB054ED371}" type="datetime1">
               <a:rPr lang="fr-FR" smtClean="0"/>
-              <a:t>28/02/2021</a:t>
+              <a:t>09/03/2021</a:t>
             </a:fld>
             <a:endParaRPr lang="fr-FR"/>
           </a:p>
@@ -3808,7 +3808,7 @@
               <a:t>Ibn </a:t>
             </a:r>
             <a:r>
-              <a:rPr kumimoji="0" lang="fr-FR" sz="2000" b="0" i="0" u="none" strike="noStrike" kern="1200" cap="none" spc="0" normalizeH="0" baseline="0" noProof="0" dirty="0" err="1">
+              <a:rPr kumimoji="0" lang="fr-FR" sz="2000" b="0" i="0" u="none" strike="noStrike" kern="1200" cap="none" spc="0" normalizeH="0" baseline="0" noProof="0" dirty="0" err="1" smtClean="0">
                 <a:ln>
                   <a:noFill/>
                 </a:ln>
@@ -3825,7 +3825,7 @@
               <a:t>Khaldoun</a:t>
             </a:r>
             <a:r>
-              <a:rPr kumimoji="0" lang="fr-FR" sz="2000" b="0" i="0" u="none" strike="noStrike" kern="1200" cap="none" spc="0" normalizeH="0" baseline="0" noProof="0" dirty="0">
+              <a:rPr kumimoji="0" lang="fr-FR" sz="2000" b="0" i="0" u="none" strike="noStrike" kern="1200" cap="none" spc="0" normalizeH="0" baseline="0" noProof="0" dirty="0" smtClean="0">
                 <a:ln>
                   <a:noFill/>
                 </a:ln>
@@ -4185,7 +4185,7 @@
         <p:spPr>
           <a:xfrm>
             <a:off x="1104944" y="3941395"/>
-            <a:ext cx="3387125" cy="1985159"/>
+            <a:ext cx="3387125" cy="1500411"/>
           </a:xfrm>
           <a:prstGeom prst="rect">
             <a:avLst/>
@@ -4247,29 +4247,10 @@
                 <a:ea typeface="+mn-ea"/>
                 <a:cs typeface="Times New Roman" pitchFamily="18" charset="0"/>
               </a:rPr>
-              <a:t> by : </a:t>
-            </a:r>
-          </a:p>
-          <a:p>
-            <a:pPr marL="0" marR="0" lvl="0" indent="0" algn="l" defTabSz="914400" rtl="0" eaLnBrk="1" fontAlgn="auto" latinLnBrk="0" hangingPunct="1">
-              <a:lnSpc>
-                <a:spcPct val="150000"/>
-              </a:lnSpc>
-              <a:spcBef>
-                <a:spcPts val="0"/>
-              </a:spcBef>
-              <a:spcAft>
-                <a:spcPts val="0"/>
-              </a:spcAft>
-              <a:buClrTx/>
-              <a:buSzTx/>
-              <a:buFontTx/>
-              <a:buNone/>
-              <a:tabLst/>
-              <a:defRPr/>
-            </a:pPr>
-            <a:r>
-              <a:rPr kumimoji="0" lang="fr-FR" sz="2000" b="1" i="0" u="none" strike="noStrike" kern="1200" cap="none" spc="0" normalizeH="0" baseline="0" noProof="0" dirty="0">
+              <a:t> </a:t>
+            </a:r>
+            <a:r>
+              <a:rPr kumimoji="0" lang="fr-FR" sz="2000" b="1" i="0" u="none" strike="noStrike" kern="1200" cap="none" spc="0" normalizeH="0" baseline="0" noProof="0" dirty="0" smtClean="0">
                 <a:ln>
                   <a:noFill/>
                 </a:ln>
@@ -4283,10 +4264,10 @@
                 <a:ea typeface="+mn-ea"/>
                 <a:cs typeface="Times New Roman" pitchFamily="18" charset="0"/>
               </a:rPr>
-              <a:t>   - </a:t>
-            </a:r>
-            <a:r>
-              <a:rPr kumimoji="0" lang="fr-FR" sz="2000" b="1" i="0" u="none" strike="noStrike" kern="1200" cap="none" spc="0" normalizeH="0" baseline="0" noProof="0" dirty="0" err="1">
+              <a:t>by</a:t>
+            </a:r>
+            <a:r>
+              <a:rPr kumimoji="0" lang="fr-FR" sz="2000" b="1" i="0" u="none" strike="noStrike" kern="1200" cap="none" spc="0" normalizeH="0" noProof="0" dirty="0" smtClean="0">
                 <a:ln>
                   <a:noFill/>
                 </a:ln>
@@ -4300,10 +4281,10 @@
                 <a:ea typeface="+mn-ea"/>
                 <a:cs typeface="Times New Roman" pitchFamily="18" charset="0"/>
               </a:rPr>
-              <a:t>Rahlaoui</a:t>
-            </a:r>
-            <a:r>
-              <a:rPr kumimoji="0" lang="fr-FR" sz="2000" b="1" i="0" u="none" strike="noStrike" kern="1200" cap="none" spc="0" normalizeH="0" baseline="0" noProof="0" dirty="0">
+              <a:t> </a:t>
+            </a:r>
+            <a:r>
+              <a:rPr kumimoji="0" lang="fr-FR" sz="2000" b="1" i="0" u="none" strike="noStrike" kern="1200" cap="none" spc="0" normalizeH="0" baseline="0" noProof="0" dirty="0" smtClean="0">
                 <a:ln>
                   <a:noFill/>
                 </a:ln>
@@ -4317,89 +4298,7 @@
                 <a:ea typeface="+mn-ea"/>
                 <a:cs typeface="Times New Roman" pitchFamily="18" charset="0"/>
               </a:rPr>
-              <a:t> Lahcen</a:t>
-            </a:r>
-          </a:p>
-          <a:p>
-            <a:pPr>
-              <a:lnSpc>
-                <a:spcPct val="150000"/>
-              </a:lnSpc>
-              <a:defRPr/>
-            </a:pPr>
-            <a:r>
-              <a:rPr kumimoji="0" lang="fr-FR" sz="2000" b="1" i="0" u="none" strike="noStrike" kern="1200" cap="none" spc="0" normalizeH="0" baseline="0" noProof="0" dirty="0">
-                <a:ln>
-                  <a:noFill/>
-                </a:ln>
-                <a:solidFill>
-                  <a:prstClr val="black"/>
-                </a:solidFill>
-                <a:effectLst/>
-                <a:uLnTx/>
-                <a:uFillTx/>
-                <a:latin typeface="Times New Roman" pitchFamily="18" charset="0"/>
-                <a:ea typeface="+mn-ea"/>
-                <a:cs typeface="Times New Roman" pitchFamily="18" charset="0"/>
-              </a:rPr>
-              <a:t>   - Laoumir Mustapha </a:t>
-            </a:r>
-            <a:r>
-              <a:rPr kumimoji="0" lang="fr-FR" sz="2000" b="1" i="0" u="none" strike="noStrike" kern="1200" cap="none" spc="0" normalizeH="0" baseline="0" noProof="0" dirty="0" smtClean="0">
-                <a:ln>
-                  <a:noFill/>
-                </a:ln>
-                <a:solidFill>
-                  <a:prstClr val="black"/>
-                </a:solidFill>
-                <a:effectLst/>
-                <a:uLnTx/>
-                <a:uFillTx/>
-                <a:latin typeface="Times New Roman" pitchFamily="18" charset="0"/>
-                <a:ea typeface="+mn-ea"/>
-                <a:cs typeface="Times New Roman" pitchFamily="18" charset="0"/>
-              </a:rPr>
-              <a:t>AEK </a:t>
-            </a:r>
-            <a:r>
-              <a:rPr lang="ja-JP" altLang="en-US" sz="100" b="1" dirty="0"/>
-              <a:t>お前はもう死んでいる</a:t>
-            </a:r>
-          </a:p>
-          <a:p>
-            <a:pPr marL="0" marR="0" lvl="0" indent="0" algn="l" defTabSz="914400" rtl="0" eaLnBrk="1" fontAlgn="auto" latinLnBrk="0" hangingPunct="1">
-              <a:lnSpc>
-                <a:spcPct val="150000"/>
-              </a:lnSpc>
-              <a:spcBef>
-                <a:spcPts val="0"/>
-              </a:spcBef>
-              <a:spcAft>
-                <a:spcPts val="0"/>
-              </a:spcAft>
-              <a:buClrTx/>
-              <a:buSzTx/>
-              <a:buFontTx/>
-              <a:buNone/>
-              <a:tabLst/>
-              <a:defRPr/>
-            </a:pPr>
-            <a:r>
-              <a:rPr kumimoji="0" lang="fr-FR" sz="2000" b="1" i="0" u="none" strike="noStrike" kern="1200" cap="none" spc="0" normalizeH="0" baseline="0" noProof="0" dirty="0" smtClean="0">
-                <a:ln>
-                  <a:noFill/>
-                </a:ln>
-                <a:solidFill>
-                  <a:prstClr val="black"/>
-                </a:solidFill>
-                <a:effectLst/>
-                <a:uLnTx/>
-                <a:uFillTx/>
-                <a:latin typeface="Times New Roman" pitchFamily="18" charset="0"/>
-                <a:ea typeface="+mn-ea"/>
-                <a:cs typeface="Times New Roman" pitchFamily="18" charset="0"/>
-              </a:rPr>
-              <a:t> </a:t>
+              <a:t>: </a:t>
             </a:r>
             <a:endParaRPr kumimoji="0" lang="fr-FR" sz="2000" b="1" i="0" u="none" strike="noStrike" kern="1200" cap="none" spc="0" normalizeH="0" baseline="0" noProof="0" dirty="0">
               <a:ln>
@@ -4415,6 +4314,127 @@
               <a:ea typeface="+mn-ea"/>
               <a:cs typeface="Times New Roman" pitchFamily="18" charset="0"/>
             </a:endParaRPr>
+          </a:p>
+          <a:p>
+            <a:pPr marL="0" marR="0" lvl="0" indent="0" algn="l" defTabSz="914400" rtl="0" eaLnBrk="1" fontAlgn="auto" latinLnBrk="0" hangingPunct="1">
+              <a:lnSpc>
+                <a:spcPct val="150000"/>
+              </a:lnSpc>
+              <a:spcBef>
+                <a:spcPts val="0"/>
+              </a:spcBef>
+              <a:spcAft>
+                <a:spcPts val="0"/>
+              </a:spcAft>
+              <a:buClrTx/>
+              <a:buSzTx/>
+              <a:buFontTx/>
+              <a:buNone/>
+              <a:tabLst/>
+              <a:defRPr/>
+            </a:pPr>
+            <a:r>
+              <a:rPr kumimoji="0" lang="fr-FR" sz="2000" b="1" i="0" u="none" strike="noStrike" kern="1200" cap="none" spc="0" normalizeH="0" baseline="0" noProof="0" dirty="0">
+                <a:ln>
+                  <a:noFill/>
+                </a:ln>
+                <a:solidFill>
+                  <a:prstClr val="black"/>
+                </a:solidFill>
+                <a:effectLst/>
+                <a:uLnTx/>
+                <a:uFillTx/>
+                <a:latin typeface="Times New Roman" pitchFamily="18" charset="0"/>
+                <a:ea typeface="+mn-ea"/>
+                <a:cs typeface="Times New Roman" pitchFamily="18" charset="0"/>
+              </a:rPr>
+              <a:t>   - </a:t>
+            </a:r>
+            <a:r>
+              <a:rPr kumimoji="0" lang="fr-FR" sz="2000" b="1" i="0" u="none" strike="noStrike" kern="1200" cap="none" spc="0" normalizeH="0" baseline="0" noProof="0" dirty="0" err="1">
+                <a:ln>
+                  <a:noFill/>
+                </a:ln>
+                <a:solidFill>
+                  <a:prstClr val="black"/>
+                </a:solidFill>
+                <a:effectLst/>
+                <a:uLnTx/>
+                <a:uFillTx/>
+                <a:latin typeface="Times New Roman" pitchFamily="18" charset="0"/>
+                <a:ea typeface="+mn-ea"/>
+                <a:cs typeface="Times New Roman" pitchFamily="18" charset="0"/>
+              </a:rPr>
+              <a:t>Rahlaoui</a:t>
+            </a:r>
+            <a:r>
+              <a:rPr kumimoji="0" lang="fr-FR" sz="2000" b="1" i="0" u="none" strike="noStrike" kern="1200" cap="none" spc="0" normalizeH="0" baseline="0" noProof="0" dirty="0">
+                <a:ln>
+                  <a:noFill/>
+                </a:ln>
+                <a:solidFill>
+                  <a:prstClr val="black"/>
+                </a:solidFill>
+                <a:effectLst/>
+                <a:uLnTx/>
+                <a:uFillTx/>
+                <a:latin typeface="Times New Roman" pitchFamily="18" charset="0"/>
+                <a:ea typeface="+mn-ea"/>
+                <a:cs typeface="Times New Roman" pitchFamily="18" charset="0"/>
+              </a:rPr>
+              <a:t> Lahcen</a:t>
+            </a:r>
+          </a:p>
+          <a:p>
+            <a:pPr>
+              <a:lnSpc>
+                <a:spcPct val="150000"/>
+              </a:lnSpc>
+              <a:defRPr/>
+            </a:pPr>
+            <a:r>
+              <a:rPr kumimoji="0" lang="fr-FR" sz="2000" b="1" i="0" u="none" strike="noStrike" kern="1200" cap="none" spc="0" normalizeH="0" baseline="0" noProof="0" dirty="0">
+                <a:ln>
+                  <a:noFill/>
+                </a:ln>
+                <a:solidFill>
+                  <a:prstClr val="black"/>
+                </a:solidFill>
+                <a:effectLst/>
+                <a:uLnTx/>
+                <a:uFillTx/>
+                <a:latin typeface="Times New Roman" pitchFamily="18" charset="0"/>
+                <a:ea typeface="+mn-ea"/>
+                <a:cs typeface="Times New Roman" pitchFamily="18" charset="0"/>
+              </a:rPr>
+              <a:t>   - Laoumir Mustapha </a:t>
+            </a:r>
+            <a:r>
+              <a:rPr kumimoji="0" lang="fr-FR" sz="2000" b="1" i="0" u="none" strike="noStrike" kern="1200" cap="none" spc="0" normalizeH="0" baseline="0" noProof="0" dirty="0" smtClean="0">
+                <a:ln>
+                  <a:noFill/>
+                </a:ln>
+                <a:solidFill>
+                  <a:prstClr val="black"/>
+                </a:solidFill>
+                <a:effectLst/>
+                <a:uLnTx/>
+                <a:uFillTx/>
+                <a:latin typeface="Times New Roman" pitchFamily="18" charset="0"/>
+                <a:ea typeface="+mn-ea"/>
+                <a:cs typeface="Times New Roman" pitchFamily="18" charset="0"/>
+              </a:rPr>
+              <a:t>AEK </a:t>
+            </a:r>
+            <a:r>
+              <a:rPr lang="ja-JP" altLang="en-US" sz="100" b="1" dirty="0"/>
+              <a:t>お前はもう死んでい</a:t>
+            </a:r>
+            <a:r>
+              <a:rPr lang="ja-JP" altLang="en-US" sz="100" b="1" dirty="0" smtClean="0"/>
+              <a:t>る</a:t>
+            </a:r>
+            <a:endParaRPr lang="ja-JP" altLang="en-US" sz="100" b="1" dirty="0"/>
           </a:p>
         </p:txBody>
       </p:sp>
@@ -4550,6 +4570,13 @@
   <p:clrMapOvr>
     <a:masterClrMapping/>
   </p:clrMapOvr>
+  <p:timing>
+    <p:tnLst>
+      <p:par>
+        <p:cTn id="1" dur="indefinite" restart="never" nodeType="tmRoot"/>
+      </p:par>
+    </p:tnLst>
+  </p:timing>
 </p:sld>
 </file>
 
@@ -28195,6 +28222,17 @@
               </a:rPr>
               <a:t>SQLite</a:t>
             </a:r>
+            <a:r>
+              <a:rPr lang="fr-FR" sz="6000" b="1" dirty="0" smtClean="0">
+                <a:solidFill>
+                  <a:prstClr val="white"/>
+                </a:solidFill>
+                <a:latin typeface="Segoe UI" pitchFamily="34" charset="0"/>
+                <a:ea typeface="Segoe UI" pitchFamily="34" charset="0"/>
+                <a:cs typeface="Segoe UI" pitchFamily="34" charset="0"/>
+              </a:rPr>
+              <a:t> introduction</a:t>
+            </a:r>
             <a:endParaRPr kumimoji="0" lang="fr-FR" sz="6000" b="1" i="0" u="none" strike="noStrike" kern="1200" cap="none" spc="0" normalizeH="0" baseline="0" noProof="0" dirty="0">
               <a:ln>
                 <a:noFill/>

</xml_diff>